<commit_message>
Added malformed ship contradiction (wip), some refactoring
</commit_message>
<xml_diff>
--- a/misc/Rules/Battleship.pptx
+++ b/misc/Rules/Battleship.pptx
@@ -309,7 +309,7 @@
           <a:p>
             <a:fld id="{31A6FDF7-6DD2-4DAD-9766-6EFD66BA8771}" type="datetimeFigureOut">
               <a:rPr lang="en-US" smtClean="0"/>
-              <a:t>10/15/2014</a:t>
+              <a:t>2/8/2015</a:t>
             </a:fld>
             <a:endParaRPr lang="en-US"/>
           </a:p>
@@ -584,7 +584,7 @@
           <a:p>
             <a:fld id="{31A6FDF7-6DD2-4DAD-9766-6EFD66BA8771}" type="datetimeFigureOut">
               <a:rPr lang="en-US" smtClean="0"/>
-              <a:t>10/15/2014</a:t>
+              <a:t>2/8/2015</a:t>
             </a:fld>
             <a:endParaRPr lang="en-US"/>
           </a:p>
@@ -778,7 +778,7 @@
           <a:p>
             <a:fld id="{31A6FDF7-6DD2-4DAD-9766-6EFD66BA8771}" type="datetimeFigureOut">
               <a:rPr lang="en-US" smtClean="0"/>
-              <a:t>10/15/2014</a:t>
+              <a:t>2/8/2015</a:t>
             </a:fld>
             <a:endParaRPr lang="en-US"/>
           </a:p>
@@ -1051,7 +1051,7 @@
           <a:p>
             <a:fld id="{31A6FDF7-6DD2-4DAD-9766-6EFD66BA8771}" type="datetimeFigureOut">
               <a:rPr lang="en-US" smtClean="0"/>
-              <a:t>10/15/2014</a:t>
+              <a:t>2/8/2015</a:t>
             </a:fld>
             <a:endParaRPr lang="en-US"/>
           </a:p>
@@ -1392,7 +1392,7 @@
           <a:p>
             <a:fld id="{31A6FDF7-6DD2-4DAD-9766-6EFD66BA8771}" type="datetimeFigureOut">
               <a:rPr lang="en-US" smtClean="0"/>
-              <a:t>10/15/2014</a:t>
+              <a:t>2/8/2015</a:t>
             </a:fld>
             <a:endParaRPr lang="en-US"/>
           </a:p>
@@ -2015,7 +2015,7 @@
           <a:p>
             <a:fld id="{31A6FDF7-6DD2-4DAD-9766-6EFD66BA8771}" type="datetimeFigureOut">
               <a:rPr lang="en-US" smtClean="0"/>
-              <a:t>10/15/2014</a:t>
+              <a:t>2/8/2015</a:t>
             </a:fld>
             <a:endParaRPr lang="en-US"/>
           </a:p>
@@ -2875,7 +2875,7 @@
           <a:p>
             <a:fld id="{31A6FDF7-6DD2-4DAD-9766-6EFD66BA8771}" type="datetimeFigureOut">
               <a:rPr lang="en-US" smtClean="0"/>
-              <a:t>10/15/2014</a:t>
+              <a:t>2/8/2015</a:t>
             </a:fld>
             <a:endParaRPr lang="en-US"/>
           </a:p>
@@ -3045,7 +3045,7 @@
           <a:p>
             <a:fld id="{31A6FDF7-6DD2-4DAD-9766-6EFD66BA8771}" type="datetimeFigureOut">
               <a:rPr lang="en-US" smtClean="0"/>
-              <a:t>10/15/2014</a:t>
+              <a:t>2/8/2015</a:t>
             </a:fld>
             <a:endParaRPr lang="en-US"/>
           </a:p>
@@ -3225,7 +3225,7 @@
           <a:p>
             <a:fld id="{31A6FDF7-6DD2-4DAD-9766-6EFD66BA8771}" type="datetimeFigureOut">
               <a:rPr lang="en-US" smtClean="0"/>
-              <a:t>10/15/2014</a:t>
+              <a:t>2/8/2015</a:t>
             </a:fld>
             <a:endParaRPr lang="en-US"/>
           </a:p>
@@ -3395,7 +3395,7 @@
           <a:p>
             <a:fld id="{31A6FDF7-6DD2-4DAD-9766-6EFD66BA8771}" type="datetimeFigureOut">
               <a:rPr lang="en-US" smtClean="0"/>
-              <a:t>10/15/2014</a:t>
+              <a:t>2/8/2015</a:t>
             </a:fld>
             <a:endParaRPr lang="en-US"/>
           </a:p>
@@ -3642,7 +3642,7 @@
           <a:p>
             <a:fld id="{31A6FDF7-6DD2-4DAD-9766-6EFD66BA8771}" type="datetimeFigureOut">
               <a:rPr lang="en-US" smtClean="0"/>
-              <a:t>10/15/2014</a:t>
+              <a:t>2/8/2015</a:t>
             </a:fld>
             <a:endParaRPr lang="en-US"/>
           </a:p>
@@ -3934,7 +3934,7 @@
           <a:p>
             <a:fld id="{31A6FDF7-6DD2-4DAD-9766-6EFD66BA8771}" type="datetimeFigureOut">
               <a:rPr lang="en-US" smtClean="0"/>
-              <a:t>10/15/2014</a:t>
+              <a:t>2/8/2015</a:t>
             </a:fld>
             <a:endParaRPr lang="en-US"/>
           </a:p>
@@ -4378,7 +4378,7 @@
           <a:p>
             <a:fld id="{31A6FDF7-6DD2-4DAD-9766-6EFD66BA8771}" type="datetimeFigureOut">
               <a:rPr lang="en-US" smtClean="0"/>
-              <a:t>10/15/2014</a:t>
+              <a:t>2/8/2015</a:t>
             </a:fld>
             <a:endParaRPr lang="en-US"/>
           </a:p>
@@ -4496,7 +4496,7 @@
           <a:p>
             <a:fld id="{31A6FDF7-6DD2-4DAD-9766-6EFD66BA8771}" type="datetimeFigureOut">
               <a:rPr lang="en-US" smtClean="0"/>
-              <a:t>10/15/2014</a:t>
+              <a:t>2/8/2015</a:t>
             </a:fld>
             <a:endParaRPr lang="en-US"/>
           </a:p>
@@ -4591,7 +4591,7 @@
           <a:p>
             <a:fld id="{31A6FDF7-6DD2-4DAD-9766-6EFD66BA8771}" type="datetimeFigureOut">
               <a:rPr lang="en-US" smtClean="0"/>
-              <a:t>10/15/2014</a:t>
+              <a:t>2/8/2015</a:t>
             </a:fld>
             <a:endParaRPr lang="en-US"/>
           </a:p>
@@ -4870,7 +4870,7 @@
           <a:p>
             <a:fld id="{31A6FDF7-6DD2-4DAD-9766-6EFD66BA8771}" type="datetimeFigureOut">
               <a:rPr lang="en-US" smtClean="0"/>
-              <a:t>10/15/2014</a:t>
+              <a:t>2/8/2015</a:t>
             </a:fld>
             <a:endParaRPr lang="en-US"/>
           </a:p>
@@ -5145,7 +5145,7 @@
           <a:p>
             <a:fld id="{31A6FDF7-6DD2-4DAD-9766-6EFD66BA8771}" type="datetimeFigureOut">
               <a:rPr lang="en-US" smtClean="0"/>
-              <a:t>10/15/2014</a:t>
+              <a:t>2/8/2015</a:t>
             </a:fld>
             <a:endParaRPr lang="en-US"/>
           </a:p>
@@ -5574,7 +5574,7 @@
           <a:p>
             <a:fld id="{31A6FDF7-6DD2-4DAD-9766-6EFD66BA8771}" type="datetimeFigureOut">
               <a:rPr lang="en-US" smtClean="0"/>
-              <a:t>10/15/2014</a:t>
+              <a:t>2/8/2015</a:t>
             </a:fld>
             <a:endParaRPr lang="en-US"/>
           </a:p>
@@ -6144,7 +6144,6 @@
               <a:rPr lang="en-US" dirty="0" smtClean="0"/>
               <a:t>Also known as Battleship Solitaire</a:t>
             </a:r>
-            <a:endParaRPr lang="en-US" dirty="0" smtClean="0"/>
           </a:p>
           <a:p>
             <a:r>
@@ -6354,11 +6353,17 @@
           <a:p>
             <a:r>
               <a:rPr lang="en-US" dirty="0" smtClean="0"/>
-              <a:t>Too few ship segments – The number of ship segments in a row/column is fewer than the amount specified by the puzzle and every square in the row/column </a:t>
-            </a:r>
-            <a:r>
-              <a:rPr lang="en-US" smtClean="0"/>
-              <a:t>is defined</a:t>
+              <a:t>Too few ship segments – The number of ship segments in a row/column is fewer than the amount specified by the puzzle and every square in the row/column is </a:t>
+            </a:r>
+            <a:r>
+              <a:rPr lang="en-US" dirty="0" smtClean="0"/>
+              <a:t>defined</a:t>
+            </a:r>
+          </a:p>
+          <a:p>
+            <a:r>
+              <a:rPr lang="en-US" dirty="0" smtClean="0"/>
+              <a:t>Malformed ship – End segments must be adjacent to a suitable segment along their direction; middle segments must be adjacent to 2 suitable segments on opposite sides</a:t>
             </a:r>
             <a:endParaRPr lang="en-US" dirty="0"/>
           </a:p>
@@ -6709,11 +6714,7 @@
             <a:pPr algn="ctr"/>
             <a:r>
               <a:rPr lang="en-US" dirty="0" smtClean="0"/>
-              <a:t>An example of a solved battleship </a:t>
-            </a:r>
-            <a:r>
-              <a:rPr lang="en-US" dirty="0" smtClean="0"/>
-              <a:t>puzzle</a:t>
+              <a:t>An example of a solved battleship puzzle</a:t>
             </a:r>
           </a:p>
           <a:p>

</xml_diff>